<commit_message>
Add Lecture 10 and Assignment 3
</commit_message>
<xml_diff>
--- a/Lecture01_Introduction/Lecture1_Frameworks_2022F.pptx
+++ b/Lecture01_Introduction/Lecture1_Frameworks_2022F.pptx
@@ -5,7 +5,7 @@
     <p:sldMasterId id="2147483738" r:id="rId1"/>
   </p:sldMasterIdLst>
   <p:notesMasterIdLst>
-    <p:notesMasterId r:id="rId40"/>
+    <p:notesMasterId r:id="rId41"/>
   </p:notesMasterIdLst>
   <p:sldIdLst>
     <p:sldId id="256" r:id="rId2"/>
@@ -15,37 +15,38 @@
     <p:sldId id="316" r:id="rId6"/>
     <p:sldId id="315" r:id="rId7"/>
     <p:sldId id="317" r:id="rId8"/>
-    <p:sldId id="257" r:id="rId9"/>
-    <p:sldId id="287" r:id="rId10"/>
-    <p:sldId id="319" r:id="rId11"/>
-    <p:sldId id="259" r:id="rId12"/>
-    <p:sldId id="288" r:id="rId13"/>
-    <p:sldId id="265" r:id="rId14"/>
-    <p:sldId id="261" r:id="rId15"/>
-    <p:sldId id="320" r:id="rId16"/>
-    <p:sldId id="321" r:id="rId17"/>
-    <p:sldId id="290" r:id="rId18"/>
-    <p:sldId id="291" r:id="rId19"/>
-    <p:sldId id="289" r:id="rId20"/>
-    <p:sldId id="293" r:id="rId21"/>
-    <p:sldId id="294" r:id="rId22"/>
-    <p:sldId id="295" r:id="rId23"/>
-    <p:sldId id="322" r:id="rId24"/>
-    <p:sldId id="323" r:id="rId25"/>
-    <p:sldId id="298" r:id="rId26"/>
-    <p:sldId id="302" r:id="rId27"/>
-    <p:sldId id="301" r:id="rId28"/>
-    <p:sldId id="306" r:id="rId29"/>
-    <p:sldId id="307" r:id="rId30"/>
-    <p:sldId id="305" r:id="rId31"/>
-    <p:sldId id="308" r:id="rId32"/>
-    <p:sldId id="309" r:id="rId33"/>
-    <p:sldId id="324" r:id="rId34"/>
-    <p:sldId id="325" r:id="rId35"/>
-    <p:sldId id="318" r:id="rId36"/>
-    <p:sldId id="312" r:id="rId37"/>
-    <p:sldId id="266" r:id="rId38"/>
-    <p:sldId id="283" r:id="rId39"/>
+    <p:sldId id="326" r:id="rId9"/>
+    <p:sldId id="257" r:id="rId10"/>
+    <p:sldId id="287" r:id="rId11"/>
+    <p:sldId id="319" r:id="rId12"/>
+    <p:sldId id="259" r:id="rId13"/>
+    <p:sldId id="288" r:id="rId14"/>
+    <p:sldId id="265" r:id="rId15"/>
+    <p:sldId id="261" r:id="rId16"/>
+    <p:sldId id="320" r:id="rId17"/>
+    <p:sldId id="321" r:id="rId18"/>
+    <p:sldId id="290" r:id="rId19"/>
+    <p:sldId id="291" r:id="rId20"/>
+    <p:sldId id="289" r:id="rId21"/>
+    <p:sldId id="293" r:id="rId22"/>
+    <p:sldId id="294" r:id="rId23"/>
+    <p:sldId id="295" r:id="rId24"/>
+    <p:sldId id="322" r:id="rId25"/>
+    <p:sldId id="323" r:id="rId26"/>
+    <p:sldId id="298" r:id="rId27"/>
+    <p:sldId id="302" r:id="rId28"/>
+    <p:sldId id="301" r:id="rId29"/>
+    <p:sldId id="306" r:id="rId30"/>
+    <p:sldId id="307" r:id="rId31"/>
+    <p:sldId id="305" r:id="rId32"/>
+    <p:sldId id="308" r:id="rId33"/>
+    <p:sldId id="309" r:id="rId34"/>
+    <p:sldId id="324" r:id="rId35"/>
+    <p:sldId id="325" r:id="rId36"/>
+    <p:sldId id="318" r:id="rId37"/>
+    <p:sldId id="312" r:id="rId38"/>
+    <p:sldId id="266" r:id="rId39"/>
+    <p:sldId id="283" r:id="rId40"/>
   </p:sldIdLst>
   <p:sldSz cx="12192000" cy="6858000"/>
   <p:notesSz cx="7010400" cy="9296400"/>
@@ -274,7 +275,7 @@
           <a:p>
             <a:fld id="{EF911157-0FC2-4F06-8D61-FD647FE4E19D}" type="datetimeFigureOut">
               <a:rPr lang="en-US" smtClean="0"/>
-              <a:t>6/11/2022</a:t>
+              <a:t>7/27/2022</a:t>
             </a:fld>
             <a:endParaRPr lang="en-US"/>
           </a:p>
@@ -677,12 +678,7 @@
             <p:ph type="sldImg"/>
           </p:nvPr>
         </p:nvSpPr>
-        <p:spPr>
-          <a:xfrm>
-            <a:off x="717550" y="1162050"/>
-            <a:ext cx="5575300" cy="3136900"/>
-          </a:xfrm>
-        </p:spPr>
+        <p:spPr/>
       </p:sp>
       <p:sp>
         <p:nvSpPr>
@@ -700,8 +696,8 @@
           <a:lstStyle/>
           <a:p>
             <a:r>
-              <a:rPr lang="en-US" dirty="0"/>
-              <a:t>Proof for this is on page 137 of SC</a:t>
+              <a:rPr lang="en-CA" dirty="0"/>
+              <a:t>There are no real-time emergencies in a university class setting – send me an email, and please be respectful of my time. Likewise, I will be respectful of yours. </a:t>
             </a:r>
           </a:p>
         </p:txBody>
@@ -723,7 +719,7 @@
           <a:p>
             <a:fld id="{4AF79E1B-2C51-4B9B-8EA4-26DE9E345AFF}" type="slidenum">
               <a:rPr lang="en-US" smtClean="0"/>
-              <a:t>35</a:t>
+              <a:t>8</a:t>
             </a:fld>
             <a:endParaRPr lang="en-US"/>
           </a:p>
@@ -732,7 +728,7 @@
     </p:spTree>
     <p:extLst>
       <p:ext uri="{BB962C8B-B14F-4D97-AF65-F5344CB8AC3E}">
-        <p14:creationId xmlns:p14="http://schemas.microsoft.com/office/powerpoint/2010/main" val="266956981"/>
+        <p14:creationId xmlns:p14="http://schemas.microsoft.com/office/powerpoint/2010/main" val="1998886115"/>
       </p:ext>
     </p:extLst>
   </p:cSld>
@@ -816,6 +812,98 @@
             <a:fld id="{4AF79E1B-2C51-4B9B-8EA4-26DE9E345AFF}" type="slidenum">
               <a:rPr lang="en-US" smtClean="0"/>
               <a:t>36</a:t>
+            </a:fld>
+            <a:endParaRPr lang="en-US"/>
+          </a:p>
+        </p:txBody>
+      </p:sp>
+    </p:spTree>
+    <p:extLst>
+      <p:ext uri="{BB962C8B-B14F-4D97-AF65-F5344CB8AC3E}">
+        <p14:creationId xmlns:p14="http://schemas.microsoft.com/office/powerpoint/2010/main" val="266956981"/>
+      </p:ext>
+    </p:extLst>
+  </p:cSld>
+  <p:clrMapOvr>
+    <a:masterClrMapping/>
+  </p:clrMapOvr>
+</p:notes>
+</file>
+
+<file path=ppt/notesSlides/notesSlide4.xml><?xml version="1.0" encoding="utf-8"?>
+<p:notes xmlns:a="http://schemas.openxmlformats.org/drawingml/2006/main" xmlns:r="http://schemas.openxmlformats.org/officeDocument/2006/relationships" xmlns:p="http://schemas.openxmlformats.org/presentationml/2006/main">
+  <p:cSld>
+    <p:spTree>
+      <p:nvGrpSpPr>
+        <p:cNvPr id="1" name=""/>
+        <p:cNvGrpSpPr/>
+        <p:nvPr/>
+      </p:nvGrpSpPr>
+      <p:grpSpPr>
+        <a:xfrm>
+          <a:off x="0" y="0"/>
+          <a:ext cx="0" cy="0"/>
+          <a:chOff x="0" y="0"/>
+          <a:chExt cx="0" cy="0"/>
+        </a:xfrm>
+      </p:grpSpPr>
+      <p:sp>
+        <p:nvSpPr>
+          <p:cNvPr id="2" name="Slide Image Placeholder 1"/>
+          <p:cNvSpPr>
+            <a:spLocks noGrp="1" noRot="1" noChangeAspect="1"/>
+          </p:cNvSpPr>
+          <p:nvPr>
+            <p:ph type="sldImg"/>
+          </p:nvPr>
+        </p:nvSpPr>
+        <p:spPr>
+          <a:xfrm>
+            <a:off x="717550" y="1162050"/>
+            <a:ext cx="5575300" cy="3136900"/>
+          </a:xfrm>
+        </p:spPr>
+      </p:sp>
+      <p:sp>
+        <p:nvSpPr>
+          <p:cNvPr id="3" name="Notes Placeholder 2"/>
+          <p:cNvSpPr>
+            <a:spLocks noGrp="1"/>
+          </p:cNvSpPr>
+          <p:nvPr>
+            <p:ph type="body" idx="1"/>
+          </p:nvPr>
+        </p:nvSpPr>
+        <p:spPr/>
+        <p:txBody>
+          <a:bodyPr/>
+          <a:lstStyle/>
+          <a:p>
+            <a:r>
+              <a:rPr lang="en-US" dirty="0"/>
+              <a:t>Proof for this is on page 137 of SC</a:t>
+            </a:r>
+          </a:p>
+        </p:txBody>
+      </p:sp>
+      <p:sp>
+        <p:nvSpPr>
+          <p:cNvPr id="4" name="Slide Number Placeholder 3"/>
+          <p:cNvSpPr>
+            <a:spLocks noGrp="1"/>
+          </p:cNvSpPr>
+          <p:nvPr>
+            <p:ph type="sldNum" sz="quarter" idx="5"/>
+          </p:nvPr>
+        </p:nvSpPr>
+        <p:spPr/>
+        <p:txBody>
+          <a:bodyPr/>
+          <a:lstStyle/>
+          <a:p>
+            <a:fld id="{4AF79E1B-2C51-4B9B-8EA4-26DE9E345AFF}" type="slidenum">
+              <a:rPr lang="en-US" smtClean="0"/>
+              <a:t>37</a:t>
             </a:fld>
             <a:endParaRPr lang="en-US"/>
           </a:p>
@@ -1003,7 +1091,7 @@
             <a:fld id="{0972D05C-DCFB-4BB6-B49C-AC126BF3ED2C}" type="datetimeFigureOut">
               <a:rPr lang="en-US" smtClean="0"/>
               <a:pPr/>
-              <a:t>6/11/2022</a:t>
+              <a:t>7/27/2022</a:t>
             </a:fld>
             <a:endParaRPr lang="en-US"/>
           </a:p>
@@ -1233,7 +1321,7 @@
             <a:fld id="{0972D05C-DCFB-4BB6-B49C-AC126BF3ED2C}" type="datetimeFigureOut">
               <a:rPr lang="en-US" smtClean="0"/>
               <a:pPr/>
-              <a:t>6/11/2022</a:t>
+              <a:t>7/27/2022</a:t>
             </a:fld>
             <a:endParaRPr lang="en-US"/>
           </a:p>
@@ -1415,7 +1503,7 @@
             <a:fld id="{0972D05C-DCFB-4BB6-B49C-AC126BF3ED2C}" type="datetimeFigureOut">
               <a:rPr lang="en-US" smtClean="0"/>
               <a:pPr/>
-              <a:t>6/11/2022</a:t>
+              <a:t>7/27/2022</a:t>
             </a:fld>
             <a:endParaRPr lang="en-US"/>
           </a:p>
@@ -1587,7 +1675,7 @@
             <a:fld id="{0972D05C-DCFB-4BB6-B49C-AC126BF3ED2C}" type="datetimeFigureOut">
               <a:rPr lang="en-US" smtClean="0"/>
               <a:pPr/>
-              <a:t>6/11/2022</a:t>
+              <a:t>7/27/2022</a:t>
             </a:fld>
             <a:endParaRPr lang="en-US"/>
           </a:p>
@@ -1843,7 +1931,7 @@
             <a:fld id="{0972D05C-DCFB-4BB6-B49C-AC126BF3ED2C}" type="datetimeFigureOut">
               <a:rPr lang="en-US" smtClean="0"/>
               <a:pPr/>
-              <a:t>6/11/2022</a:t>
+              <a:t>7/27/2022</a:t>
             </a:fld>
             <a:endParaRPr lang="en-US"/>
           </a:p>
@@ -2171,7 +2259,7 @@
             <a:fld id="{0972D05C-DCFB-4BB6-B49C-AC126BF3ED2C}" type="datetimeFigureOut">
               <a:rPr lang="en-US" smtClean="0"/>
               <a:pPr/>
-              <a:t>6/11/2022</a:t>
+              <a:t>7/27/2022</a:t>
             </a:fld>
             <a:endParaRPr lang="en-US"/>
           </a:p>
@@ -2624,7 +2712,7 @@
             <a:fld id="{0972D05C-DCFB-4BB6-B49C-AC126BF3ED2C}" type="datetimeFigureOut">
               <a:rPr lang="en-US" smtClean="0"/>
               <a:pPr/>
-              <a:t>6/11/2022</a:t>
+              <a:t>7/27/2022</a:t>
             </a:fld>
             <a:endParaRPr lang="en-US"/>
           </a:p>
@@ -2744,7 +2832,7 @@
             <a:fld id="{0972D05C-DCFB-4BB6-B49C-AC126BF3ED2C}" type="datetimeFigureOut">
               <a:rPr lang="en-US" smtClean="0"/>
               <a:pPr/>
-              <a:t>6/11/2022</a:t>
+              <a:t>7/27/2022</a:t>
             </a:fld>
             <a:endParaRPr lang="en-US"/>
           </a:p>
@@ -2841,7 +2929,7 @@
             <a:fld id="{0972D05C-DCFB-4BB6-B49C-AC126BF3ED2C}" type="datetimeFigureOut">
               <a:rPr lang="en-US" smtClean="0"/>
               <a:pPr/>
-              <a:t>6/11/2022</a:t>
+              <a:t>7/27/2022</a:t>
             </a:fld>
             <a:endParaRPr lang="en-US"/>
           </a:p>
@@ -3130,7 +3218,7 @@
             <a:fld id="{0972D05C-DCFB-4BB6-B49C-AC126BF3ED2C}" type="datetimeFigureOut">
               <a:rPr lang="en-US" smtClean="0"/>
               <a:pPr/>
-              <a:t>6/11/2022</a:t>
+              <a:t>7/27/2022</a:t>
             </a:fld>
             <a:endParaRPr lang="en-US"/>
           </a:p>
@@ -3454,7 +3542,7 @@
             <a:fld id="{0972D05C-DCFB-4BB6-B49C-AC126BF3ED2C}" type="datetimeFigureOut">
               <a:rPr lang="en-US" smtClean="0"/>
               <a:pPr/>
-              <a:t>6/11/2022</a:t>
+              <a:t>7/27/2022</a:t>
             </a:fld>
             <a:endParaRPr lang="en-US"/>
           </a:p>
@@ -3709,7 +3797,7 @@
             <a:fld id="{0972D05C-DCFB-4BB6-B49C-AC126BF3ED2C}" type="datetimeFigureOut">
               <a:rPr lang="en-US" smtClean="0"/>
               <a:pPr/>
-              <a:t>6/11/2022</a:t>
+              <a:t>7/27/2022</a:t>
             </a:fld>
             <a:endParaRPr lang="en-US" dirty="0"/>
           </a:p>
@@ -4351,7 +4439,7 @@
         <p:spPr>
           <a:xfrm>
             <a:off x="990600" y="1143001"/>
-            <a:ext cx="10210800" cy="5065188"/>
+            <a:ext cx="9982200" cy="5065188"/>
           </a:xfrm>
         </p:spPr>
         <p:txBody>
@@ -4372,56 +4460,6 @@
               <a:rPr lang="en-US" sz="2000" dirty="0"/>
               <a:t>RCTs are useful in some settings, but what are some problems with them? </a:t>
             </a:r>
-          </a:p>
-          <a:p>
-            <a:pPr lvl="1"/>
-            <a:r>
-              <a:rPr lang="en-US" sz="1800" dirty="0"/>
-              <a:t>Not always feasible</a:t>
-            </a:r>
-          </a:p>
-          <a:p>
-            <a:pPr lvl="1"/>
-            <a:r>
-              <a:rPr lang="en-US" sz="1800" dirty="0"/>
-              <a:t>Implicit biases</a:t>
-            </a:r>
-          </a:p>
-          <a:p>
-            <a:pPr lvl="1"/>
-            <a:r>
-              <a:rPr lang="en-US" sz="1800" dirty="0"/>
-              <a:t>Can’t always detect negative side effects</a:t>
-            </a:r>
-          </a:p>
-          <a:p>
-            <a:pPr lvl="1"/>
-            <a:r>
-              <a:rPr lang="en-US" sz="1800" dirty="0"/>
-              <a:t>Problems with external validity, scaling, etc. </a:t>
-            </a:r>
-          </a:p>
-          <a:p>
-            <a:r>
-              <a:rPr lang="en-US" sz="2000" dirty="0"/>
-              <a:t>Econometric analysis helps identify </a:t>
-            </a:r>
-            <a:r>
-              <a:rPr lang="en-US" sz="2000" b="1" dirty="0"/>
-              <a:t>real world patterns </a:t>
-            </a:r>
-            <a:r>
-              <a:rPr lang="en-US" sz="2000" dirty="0"/>
-              <a:t>from </a:t>
-            </a:r>
-            <a:r>
-              <a:rPr lang="en-US" sz="2000" b="1" dirty="0"/>
-              <a:t>real world data</a:t>
-            </a:r>
-            <a:endParaRPr lang="en-US" sz="2000" dirty="0"/>
-          </a:p>
-          <a:p>
-            <a:pPr lvl="1"/>
             <a:endParaRPr lang="en-US" dirty="0"/>
           </a:p>
         </p:txBody>
@@ -4429,7 +4467,7 @@
     </p:spTree>
     <p:extLst>
       <p:ext uri="{BB962C8B-B14F-4D97-AF65-F5344CB8AC3E}">
-        <p14:creationId xmlns:p14="http://schemas.microsoft.com/office/powerpoint/2010/main" val="397007063"/>
+        <p14:creationId xmlns:p14="http://schemas.microsoft.com/office/powerpoint/2010/main" val="4190568736"/>
       </p:ext>
     </p:extLst>
   </p:cSld>
@@ -4468,8 +4506,8 @@
         </p:nvSpPr>
         <p:spPr>
           <a:xfrm>
-            <a:off x="1066800" y="381000"/>
-            <a:ext cx="7606284" cy="624840"/>
+            <a:off x="762000" y="337392"/>
+            <a:ext cx="7269480" cy="624840"/>
           </a:xfrm>
         </p:spPr>
         <p:txBody>
@@ -4478,9 +4516,10 @@
           </a:bodyPr>
           <a:lstStyle/>
           <a:p>
+            <a:pPr algn="ctr"/>
             <a:r>
               <a:rPr lang="en-US" dirty="0"/>
-              <a:t>Econometric approach</a:t>
+              <a:t>All that glitters is an RCT?</a:t>
             </a:r>
           </a:p>
         </p:txBody>
@@ -4497,73 +4536,88 @@
         </p:nvSpPr>
         <p:spPr>
           <a:xfrm>
-            <a:off x="1143000" y="1005840"/>
-            <a:ext cx="9982200" cy="5090160"/>
+            <a:off x="990600" y="1143001"/>
+            <a:ext cx="10210800" cy="5065188"/>
           </a:xfrm>
         </p:spPr>
         <p:txBody>
-          <a:bodyPr>
-            <a:normAutofit/>
-          </a:bodyPr>
+          <a:bodyPr/>
           <a:lstStyle/>
           <a:p>
             <a:r>
+              <a:rPr lang="en-US" sz="2000" dirty="0"/>
+              <a:t>Can we only believe </a:t>
+            </a:r>
+            <a:r>
               <a:rPr lang="en-US" sz="2000" b="1" dirty="0"/>
-              <a:t>Observational data: </a:t>
-            </a:r>
+              <a:t>randomized control trials?</a:t>
+            </a:r>
+          </a:p>
+          <a:p>
             <a:r>
               <a:rPr lang="en-US" sz="2000" dirty="0"/>
-              <a:t>retrospective, “real-world” data</a:t>
+              <a:t>RCTs are useful in some settings, but what are some problems with them? </a:t>
             </a:r>
           </a:p>
           <a:p>
             <a:pPr lvl="1"/>
             <a:r>
+              <a:rPr lang="en-US" sz="1800" dirty="0"/>
+              <a:t>Not always feasible</a:t>
+            </a:r>
+          </a:p>
+          <a:p>
+            <a:pPr lvl="1"/>
+            <a:r>
+              <a:rPr lang="en-US" sz="1800" dirty="0"/>
+              <a:t>Implicit biases</a:t>
+            </a:r>
+          </a:p>
+          <a:p>
+            <a:pPr lvl="1"/>
+            <a:r>
+              <a:rPr lang="en-US" sz="1800" dirty="0"/>
+              <a:t>Can’t always detect negative side effects</a:t>
+            </a:r>
+          </a:p>
+          <a:p>
+            <a:pPr lvl="1"/>
+            <a:r>
+              <a:rPr lang="en-US" sz="1800" dirty="0"/>
+              <a:t>Problems with external validity, scaling, etc. </a:t>
+            </a:r>
+          </a:p>
+          <a:p>
+            <a:r>
               <a:rPr lang="en-US" sz="2000" dirty="0"/>
-              <a:t>Not collected in a lab (or lab setting)</a:t>
-            </a:r>
+              <a:t>Econometric analysis helps identify </a:t>
+            </a:r>
+            <a:r>
+              <a:rPr lang="en-US" sz="2000" b="1" dirty="0"/>
+              <a:t>real world patterns </a:t>
+            </a:r>
+            <a:r>
+              <a:rPr lang="en-US" sz="2000" dirty="0"/>
+              <a:t>from </a:t>
+            </a:r>
+            <a:r>
+              <a:rPr lang="en-US" sz="2000" b="1" dirty="0"/>
+              <a:t>real world data</a:t>
+            </a:r>
+            <a:endParaRPr lang="en-US" sz="2000" dirty="0"/>
           </a:p>
           <a:p>
             <a:pPr lvl="1"/>
-            <a:r>
-              <a:rPr lang="en-US" sz="2000" dirty="0"/>
-              <a:t>Surveys, claims, tax records, etc. </a:t>
-            </a:r>
-          </a:p>
-          <a:p>
-            <a:r>
-              <a:rPr lang="en-US" sz="2000" dirty="0"/>
-              <a:t>What created that data? </a:t>
-            </a:r>
-          </a:p>
-          <a:p>
-            <a:pPr lvl="1"/>
-            <a:r>
-              <a:rPr lang="en-US" sz="2000" b="1" dirty="0"/>
-              <a:t>Data Generating Process: </a:t>
-            </a:r>
-            <a:r>
-              <a:rPr lang="en-US" sz="2000" dirty="0"/>
-              <a:t>what unique collection of characteristics, events, and randomness coalesced to form the data we are looking at? </a:t>
-            </a:r>
-          </a:p>
-          <a:p>
-            <a:pPr lvl="1"/>
-            <a:r>
-              <a:rPr lang="en-US" sz="2000" dirty="0"/>
-              <a:t>Our objective is to use the data available to try and establish the nature of the true DGP.</a:t>
-            </a:r>
-          </a:p>
-          <a:p>
-            <a:pPr lvl="1"/>
-            <a:r>
-              <a:rPr lang="en-US" sz="2000" dirty="0"/>
-              <a:t>But many different DGPs are possible, and many may yield very similar patterns!</a:t>
-            </a:r>
+            <a:endParaRPr lang="en-US" dirty="0"/>
           </a:p>
         </p:txBody>
       </p:sp>
     </p:spTree>
+    <p:extLst>
+      <p:ext uri="{BB962C8B-B14F-4D97-AF65-F5344CB8AC3E}">
+        <p14:creationId xmlns:p14="http://schemas.microsoft.com/office/powerpoint/2010/main" val="397007063"/>
+      </p:ext>
+    </p:extLst>
   </p:cSld>
   <p:clrMapOvr>
     <a:masterClrMapping/>
@@ -4629,6 +4683,138 @@
         </p:nvSpPr>
         <p:spPr>
           <a:xfrm>
+            <a:off x="1143000" y="1005840"/>
+            <a:ext cx="9982200" cy="5090160"/>
+          </a:xfrm>
+        </p:spPr>
+        <p:txBody>
+          <a:bodyPr>
+            <a:normAutofit/>
+          </a:bodyPr>
+          <a:lstStyle/>
+          <a:p>
+            <a:r>
+              <a:rPr lang="en-US" sz="2000" b="1" dirty="0"/>
+              <a:t>Observational data: </a:t>
+            </a:r>
+            <a:r>
+              <a:rPr lang="en-US" sz="2000" dirty="0"/>
+              <a:t>retrospective, “real-world” data</a:t>
+            </a:r>
+          </a:p>
+          <a:p>
+            <a:pPr lvl="1"/>
+            <a:r>
+              <a:rPr lang="en-US" sz="2000" dirty="0"/>
+              <a:t>Not collected in a lab (or lab setting)</a:t>
+            </a:r>
+          </a:p>
+          <a:p>
+            <a:pPr lvl="1"/>
+            <a:r>
+              <a:rPr lang="en-US" sz="2000" dirty="0"/>
+              <a:t>Surveys, claims, tax records, etc. </a:t>
+            </a:r>
+          </a:p>
+          <a:p>
+            <a:r>
+              <a:rPr lang="en-US" sz="2000" dirty="0"/>
+              <a:t>What created that data? </a:t>
+            </a:r>
+          </a:p>
+          <a:p>
+            <a:pPr lvl="1"/>
+            <a:r>
+              <a:rPr lang="en-US" sz="2000" b="1" dirty="0"/>
+              <a:t>Data Generating Process: </a:t>
+            </a:r>
+            <a:r>
+              <a:rPr lang="en-US" sz="2000" dirty="0"/>
+              <a:t>what unique collection of characteristics, events, and randomness coalesced to form the data we are looking at? </a:t>
+            </a:r>
+          </a:p>
+          <a:p>
+            <a:pPr lvl="1"/>
+            <a:r>
+              <a:rPr lang="en-US" sz="2000" dirty="0"/>
+              <a:t>Our objective is to use the data available to try and establish the nature of the true DGP.</a:t>
+            </a:r>
+          </a:p>
+          <a:p>
+            <a:pPr lvl="1"/>
+            <a:r>
+              <a:rPr lang="en-US" sz="2000" dirty="0"/>
+              <a:t>But many different DGPs are possible, and many may yield very similar patterns!</a:t>
+            </a:r>
+          </a:p>
+        </p:txBody>
+      </p:sp>
+    </p:spTree>
+  </p:cSld>
+  <p:clrMapOvr>
+    <a:masterClrMapping/>
+  </p:clrMapOvr>
+</p:sld>
+</file>
+
+<file path=ppt/slides/slide13.xml><?xml version="1.0" encoding="utf-8"?>
+<p:sld xmlns:a="http://schemas.openxmlformats.org/drawingml/2006/main" xmlns:r="http://schemas.openxmlformats.org/officeDocument/2006/relationships" xmlns:p="http://schemas.openxmlformats.org/presentationml/2006/main">
+  <p:cSld>
+    <p:spTree>
+      <p:nvGrpSpPr>
+        <p:cNvPr id="1" name=""/>
+        <p:cNvGrpSpPr/>
+        <p:nvPr/>
+      </p:nvGrpSpPr>
+      <p:grpSpPr>
+        <a:xfrm>
+          <a:off x="0" y="0"/>
+          <a:ext cx="0" cy="0"/>
+          <a:chOff x="0" y="0"/>
+          <a:chExt cx="0" cy="0"/>
+        </a:xfrm>
+      </p:grpSpPr>
+      <p:sp>
+        <p:nvSpPr>
+          <p:cNvPr id="2" name="Title 1"/>
+          <p:cNvSpPr>
+            <a:spLocks noGrp="1"/>
+          </p:cNvSpPr>
+          <p:nvPr>
+            <p:ph type="title"/>
+          </p:nvPr>
+        </p:nvSpPr>
+        <p:spPr>
+          <a:xfrm>
+            <a:off x="1066800" y="381000"/>
+            <a:ext cx="7606284" cy="624840"/>
+          </a:xfrm>
+        </p:spPr>
+        <p:txBody>
+          <a:bodyPr>
+            <a:noAutofit/>
+          </a:bodyPr>
+          <a:lstStyle/>
+          <a:p>
+            <a:r>
+              <a:rPr lang="en-US" dirty="0"/>
+              <a:t>Econometric approach</a:t>
+            </a:r>
+          </a:p>
+        </p:txBody>
+      </p:sp>
+      <p:sp>
+        <p:nvSpPr>
+          <p:cNvPr id="3" name="Content Placeholder 2"/>
+          <p:cNvSpPr>
+            <a:spLocks noGrp="1"/>
+          </p:cNvSpPr>
+          <p:nvPr>
+            <p:ph idx="1"/>
+          </p:nvPr>
+        </p:nvSpPr>
+        <p:spPr>
+          <a:xfrm>
             <a:off x="1219200" y="1005840"/>
             <a:ext cx="8458200" cy="5090160"/>
           </a:xfrm>
@@ -4728,7 +4914,7 @@
 </p:sld>
 </file>
 
-<file path=ppt/slides/slide13.xml><?xml version="1.0" encoding="utf-8"?>
+<file path=ppt/slides/slide14.xml><?xml version="1.0" encoding="utf-8"?>
 <p:sld xmlns:a="http://schemas.openxmlformats.org/drawingml/2006/main" xmlns:r="http://schemas.openxmlformats.org/officeDocument/2006/relationships" xmlns:p="http://schemas.openxmlformats.org/presentationml/2006/main">
   <p:cSld>
     <p:spTree>
@@ -4872,7 +5058,7 @@
 </p:sld>
 </file>
 
-<file path=ppt/slides/slide14.xml><?xml version="1.0" encoding="utf-8"?>
+<file path=ppt/slides/slide15.xml><?xml version="1.0" encoding="utf-8"?>
 <p:sld xmlns:a="http://schemas.openxmlformats.org/drawingml/2006/main" xmlns:r="http://schemas.openxmlformats.org/officeDocument/2006/relationships" xmlns:p="http://schemas.openxmlformats.org/presentationml/2006/main">
   <p:cSld>
     <p:spTree>
@@ -5268,7 +5454,7 @@
 </p:sld>
 </file>
 
-<file path=ppt/slides/slide15.xml><?xml version="1.0" encoding="utf-8"?>
+<file path=ppt/slides/slide16.xml><?xml version="1.0" encoding="utf-8"?>
 <p:sld xmlns:a="http://schemas.openxmlformats.org/drawingml/2006/main" xmlns:r="http://schemas.openxmlformats.org/officeDocument/2006/relationships" xmlns:p="http://schemas.openxmlformats.org/presentationml/2006/main">
   <p:cSld>
     <p:spTree>
@@ -5728,7 +5914,7 @@
 </p:sld>
 </file>
 
-<file path=ppt/slides/slide16.xml><?xml version="1.0" encoding="utf-8"?>
+<file path=ppt/slides/slide17.xml><?xml version="1.0" encoding="utf-8"?>
 <p:sld xmlns:a="http://schemas.openxmlformats.org/drawingml/2006/main" xmlns:r="http://schemas.openxmlformats.org/officeDocument/2006/relationships" xmlns:p="http://schemas.openxmlformats.org/presentationml/2006/main">
   <p:cSld>
     <p:spTree>
@@ -6300,7 +6486,7 @@
 </p:sld>
 </file>
 
-<file path=ppt/slides/slide17.xml><?xml version="1.0" encoding="utf-8"?>
+<file path=ppt/slides/slide18.xml><?xml version="1.0" encoding="utf-8"?>
 <p:sld xmlns:a="http://schemas.openxmlformats.org/drawingml/2006/main" xmlns:r="http://schemas.openxmlformats.org/officeDocument/2006/relationships" xmlns:p="http://schemas.openxmlformats.org/presentationml/2006/main">
   <p:cSld>
     <p:spTree>
@@ -7141,7 +7327,7 @@
 </p:sld>
 </file>
 
-<file path=ppt/slides/slide18.xml><?xml version="1.0" encoding="utf-8"?>
+<file path=ppt/slides/slide19.xml><?xml version="1.0" encoding="utf-8"?>
 <p:sld xmlns:a="http://schemas.openxmlformats.org/drawingml/2006/main" xmlns:r="http://schemas.openxmlformats.org/officeDocument/2006/relationships" xmlns:p="http://schemas.openxmlformats.org/presentationml/2006/main">
   <p:cSld>
     <p:spTree>
@@ -8150,7 +8336,103 @@
 </p:sld>
 </file>
 
-<file path=ppt/slides/slide19.xml><?xml version="1.0" encoding="utf-8"?>
+<file path=ppt/slides/slide2.xml><?xml version="1.0" encoding="utf-8"?>
+<p:sld xmlns:a="http://schemas.openxmlformats.org/drawingml/2006/main" xmlns:r="http://schemas.openxmlformats.org/officeDocument/2006/relationships" xmlns:p="http://schemas.openxmlformats.org/presentationml/2006/main">
+  <p:cSld>
+    <p:spTree>
+      <p:nvGrpSpPr>
+        <p:cNvPr id="1" name=""/>
+        <p:cNvGrpSpPr/>
+        <p:nvPr/>
+      </p:nvGrpSpPr>
+      <p:grpSpPr>
+        <a:xfrm>
+          <a:off x="0" y="0"/>
+          <a:ext cx="0" cy="0"/>
+          <a:chOff x="0" y="0"/>
+          <a:chExt cx="0" cy="0"/>
+        </a:xfrm>
+      </p:grpSpPr>
+      <p:sp>
+        <p:nvSpPr>
+          <p:cNvPr id="2" name="Title 1">
+            <a:extLst>
+              <a:ext uri="{FF2B5EF4-FFF2-40B4-BE49-F238E27FC236}">
+                <a16:creationId xmlns:a16="http://schemas.microsoft.com/office/drawing/2014/main" id="{E54BD568-A3DE-4D27-9652-A8CF021A9E7A}"/>
+              </a:ext>
+            </a:extLst>
+          </p:cNvPr>
+          <p:cNvSpPr>
+            <a:spLocks noGrp="1"/>
+          </p:cNvSpPr>
+          <p:nvPr>
+            <p:ph type="title"/>
+          </p:nvPr>
+        </p:nvSpPr>
+        <p:spPr>
+          <a:xfrm>
+            <a:off x="1261872" y="365760"/>
+            <a:ext cx="9692640" cy="777240"/>
+          </a:xfrm>
+        </p:spPr>
+        <p:txBody>
+          <a:bodyPr/>
+          <a:lstStyle/>
+          <a:p>
+            <a:r>
+              <a:rPr lang="en-US" dirty="0"/>
+              <a:t>Introduction &amp; Syllabus</a:t>
+            </a:r>
+          </a:p>
+        </p:txBody>
+      </p:sp>
+      <p:pic>
+        <p:nvPicPr>
+          <p:cNvPr id="5" name="Content Placeholder 4" descr="A group of people posing for the camera&#10;&#10;Description automatically generated">
+            <a:extLst>
+              <a:ext uri="{FF2B5EF4-FFF2-40B4-BE49-F238E27FC236}">
+                <a16:creationId xmlns:a16="http://schemas.microsoft.com/office/drawing/2014/main" id="{05B97C3B-5375-46FF-8DF1-E978AD7F137B}"/>
+              </a:ext>
+            </a:extLst>
+          </p:cNvPr>
+          <p:cNvPicPr>
+            <a:picLocks noGrp="1" noChangeAspect="1"/>
+          </p:cNvPicPr>
+          <p:nvPr>
+            <p:ph idx="1"/>
+          </p:nvPr>
+        </p:nvPicPr>
+        <p:blipFill rotWithShape="1">
+          <a:blip r:embed="rId2" cstate="print">
+            <a:extLst>
+              <a:ext uri="{28A0092B-C50C-407E-A947-70E740481C1C}">
+                <a14:useLocalDpi xmlns:a14="http://schemas.microsoft.com/office/drawing/2010/main" val="0"/>
+              </a:ext>
+            </a:extLst>
+          </a:blip>
+          <a:stretch/>
+        </p:blipFill>
+        <p:spPr>
+          <a:xfrm>
+            <a:off x="1371600" y="1066800"/>
+            <a:ext cx="4191000" cy="5591707"/>
+          </a:xfrm>
+        </p:spPr>
+      </p:pic>
+    </p:spTree>
+    <p:extLst>
+      <p:ext uri="{BB962C8B-B14F-4D97-AF65-F5344CB8AC3E}">
+        <p14:creationId xmlns:p14="http://schemas.microsoft.com/office/powerpoint/2010/main" val="1453377438"/>
+      </p:ext>
+    </p:extLst>
+  </p:cSld>
+  <p:clrMapOvr>
+    <a:masterClrMapping/>
+  </p:clrMapOvr>
+</p:sld>
+</file>
+
+<file path=ppt/slides/slide20.xml><?xml version="1.0" encoding="utf-8"?>
 <p:sld xmlns:a="http://schemas.openxmlformats.org/drawingml/2006/main" xmlns:r="http://schemas.openxmlformats.org/officeDocument/2006/relationships" xmlns:p="http://schemas.openxmlformats.org/presentationml/2006/main">
   <p:cSld>
     <p:spTree>
@@ -8920,103 +9202,7 @@
 </p:sld>
 </file>
 
-<file path=ppt/slides/slide2.xml><?xml version="1.0" encoding="utf-8"?>
-<p:sld xmlns:a="http://schemas.openxmlformats.org/drawingml/2006/main" xmlns:r="http://schemas.openxmlformats.org/officeDocument/2006/relationships" xmlns:p="http://schemas.openxmlformats.org/presentationml/2006/main">
-  <p:cSld>
-    <p:spTree>
-      <p:nvGrpSpPr>
-        <p:cNvPr id="1" name=""/>
-        <p:cNvGrpSpPr/>
-        <p:nvPr/>
-      </p:nvGrpSpPr>
-      <p:grpSpPr>
-        <a:xfrm>
-          <a:off x="0" y="0"/>
-          <a:ext cx="0" cy="0"/>
-          <a:chOff x="0" y="0"/>
-          <a:chExt cx="0" cy="0"/>
-        </a:xfrm>
-      </p:grpSpPr>
-      <p:sp>
-        <p:nvSpPr>
-          <p:cNvPr id="2" name="Title 1">
-            <a:extLst>
-              <a:ext uri="{FF2B5EF4-FFF2-40B4-BE49-F238E27FC236}">
-                <a16:creationId xmlns:a16="http://schemas.microsoft.com/office/drawing/2014/main" id="{E54BD568-A3DE-4D27-9652-A8CF021A9E7A}"/>
-              </a:ext>
-            </a:extLst>
-          </p:cNvPr>
-          <p:cNvSpPr>
-            <a:spLocks noGrp="1"/>
-          </p:cNvSpPr>
-          <p:nvPr>
-            <p:ph type="title"/>
-          </p:nvPr>
-        </p:nvSpPr>
-        <p:spPr>
-          <a:xfrm>
-            <a:off x="1261872" y="365760"/>
-            <a:ext cx="9692640" cy="777240"/>
-          </a:xfrm>
-        </p:spPr>
-        <p:txBody>
-          <a:bodyPr/>
-          <a:lstStyle/>
-          <a:p>
-            <a:r>
-              <a:rPr lang="en-US" dirty="0"/>
-              <a:t>Introduction &amp; Syllabus</a:t>
-            </a:r>
-          </a:p>
-        </p:txBody>
-      </p:sp>
-      <p:pic>
-        <p:nvPicPr>
-          <p:cNvPr id="5" name="Content Placeholder 4" descr="A group of people posing for the camera&#10;&#10;Description automatically generated">
-            <a:extLst>
-              <a:ext uri="{FF2B5EF4-FFF2-40B4-BE49-F238E27FC236}">
-                <a16:creationId xmlns:a16="http://schemas.microsoft.com/office/drawing/2014/main" id="{05B97C3B-5375-46FF-8DF1-E978AD7F137B}"/>
-              </a:ext>
-            </a:extLst>
-          </p:cNvPr>
-          <p:cNvPicPr>
-            <a:picLocks noGrp="1" noChangeAspect="1"/>
-          </p:cNvPicPr>
-          <p:nvPr>
-            <p:ph idx="1"/>
-          </p:nvPr>
-        </p:nvPicPr>
-        <p:blipFill rotWithShape="1">
-          <a:blip r:embed="rId2" cstate="print">
-            <a:extLst>
-              <a:ext uri="{28A0092B-C50C-407E-A947-70E740481C1C}">
-                <a14:useLocalDpi xmlns:a14="http://schemas.microsoft.com/office/drawing/2010/main" val="0"/>
-              </a:ext>
-            </a:extLst>
-          </a:blip>
-          <a:stretch/>
-        </p:blipFill>
-        <p:spPr>
-          <a:xfrm>
-            <a:off x="1371600" y="1066800"/>
-            <a:ext cx="4191000" cy="5591707"/>
-          </a:xfrm>
-        </p:spPr>
-      </p:pic>
-    </p:spTree>
-    <p:extLst>
-      <p:ext uri="{BB962C8B-B14F-4D97-AF65-F5344CB8AC3E}">
-        <p14:creationId xmlns:p14="http://schemas.microsoft.com/office/powerpoint/2010/main" val="1453377438"/>
-      </p:ext>
-    </p:extLst>
-  </p:cSld>
-  <p:clrMapOvr>
-    <a:masterClrMapping/>
-  </p:clrMapOvr>
-</p:sld>
-</file>
-
-<file path=ppt/slides/slide20.xml><?xml version="1.0" encoding="utf-8"?>
+<file path=ppt/slides/slide21.xml><?xml version="1.0" encoding="utf-8"?>
 <p:sld xmlns:a="http://schemas.openxmlformats.org/drawingml/2006/main" xmlns:r="http://schemas.openxmlformats.org/officeDocument/2006/relationships" xmlns:p="http://schemas.openxmlformats.org/presentationml/2006/main">
   <p:cSld>
     <p:spTree>
@@ -9363,7 +9549,7 @@
 </p:sld>
 </file>
 
-<file path=ppt/slides/slide21.xml><?xml version="1.0" encoding="utf-8"?>
+<file path=ppt/slides/slide22.xml><?xml version="1.0" encoding="utf-8"?>
 <p:sld xmlns:a="http://schemas.openxmlformats.org/drawingml/2006/main" xmlns:r="http://schemas.openxmlformats.org/officeDocument/2006/relationships" xmlns:p="http://schemas.openxmlformats.org/presentationml/2006/main">
   <p:cSld>
     <p:spTree>
@@ -10031,7 +10217,7 @@
 </p:sld>
 </file>
 
-<file path=ppt/slides/slide22.xml><?xml version="1.0" encoding="utf-8"?>
+<file path=ppt/slides/slide23.xml><?xml version="1.0" encoding="utf-8"?>
 <p:sld xmlns:a="http://schemas.openxmlformats.org/drawingml/2006/main" xmlns:r="http://schemas.openxmlformats.org/officeDocument/2006/relationships" xmlns:p="http://schemas.openxmlformats.org/presentationml/2006/main">
   <p:cSld>
     <p:spTree>
@@ -10637,7 +10823,7 @@
 </p:sld>
 </file>
 
-<file path=ppt/slides/slide23.xml><?xml version="1.0" encoding="utf-8"?>
+<file path=ppt/slides/slide24.xml><?xml version="1.0" encoding="utf-8"?>
 <p:sld xmlns:a="http://schemas.openxmlformats.org/drawingml/2006/main" xmlns:r="http://schemas.openxmlformats.org/officeDocument/2006/relationships" xmlns:p="http://schemas.openxmlformats.org/presentationml/2006/main">
   <p:cSld>
     <p:spTree>
@@ -11318,7 +11504,7 @@
 </p:sld>
 </file>
 
-<file path=ppt/slides/slide24.xml><?xml version="1.0" encoding="utf-8"?>
+<file path=ppt/slides/slide25.xml><?xml version="1.0" encoding="utf-8"?>
 <p:sld xmlns:a="http://schemas.openxmlformats.org/drawingml/2006/main" xmlns:r="http://schemas.openxmlformats.org/officeDocument/2006/relationships" xmlns:p="http://schemas.openxmlformats.org/presentationml/2006/main">
   <p:cSld>
     <p:spTree>
@@ -12102,7 +12288,7 @@
 </p:sld>
 </file>
 
-<file path=ppt/slides/slide25.xml><?xml version="1.0" encoding="utf-8"?>
+<file path=ppt/slides/slide26.xml><?xml version="1.0" encoding="utf-8"?>
 <p:sld xmlns:a="http://schemas.openxmlformats.org/drawingml/2006/main" xmlns:r="http://schemas.openxmlformats.org/officeDocument/2006/relationships" xmlns:p="http://schemas.openxmlformats.org/presentationml/2006/main">
   <p:cSld>
     <p:spTree>
@@ -13854,7 +14040,7 @@
 </p:sld>
 </file>
 
-<file path=ppt/slides/slide26.xml><?xml version="1.0" encoding="utf-8"?>
+<file path=ppt/slides/slide27.xml><?xml version="1.0" encoding="utf-8"?>
 <p:sld xmlns:a="http://schemas.openxmlformats.org/drawingml/2006/main" xmlns:r="http://schemas.openxmlformats.org/officeDocument/2006/relationships" xmlns:p="http://schemas.openxmlformats.org/presentationml/2006/main">
   <p:cSld>
     <p:spTree>
@@ -16897,7 +17083,7 @@
 </p:sld>
 </file>
 
-<file path=ppt/slides/slide27.xml><?xml version="1.0" encoding="utf-8"?>
+<file path=ppt/slides/slide28.xml><?xml version="1.0" encoding="utf-8"?>
 <p:sld xmlns:a="http://schemas.openxmlformats.org/drawingml/2006/main" xmlns:r="http://schemas.openxmlformats.org/officeDocument/2006/relationships" xmlns:p="http://schemas.openxmlformats.org/presentationml/2006/main">
   <p:cSld>
     <p:spTree>
@@ -18846,7 +19032,7 @@
 </p:sld>
 </file>
 
-<file path=ppt/slides/slide28.xml><?xml version="1.0" encoding="utf-8"?>
+<file path=ppt/slides/slide29.xml><?xml version="1.0" encoding="utf-8"?>
 <p:sld xmlns:a="http://schemas.openxmlformats.org/drawingml/2006/main" xmlns:r="http://schemas.openxmlformats.org/officeDocument/2006/relationships" xmlns:p="http://schemas.openxmlformats.org/presentationml/2006/main">
   <p:cSld>
     <p:spTree>
@@ -21250,7 +21436,205 @@
 </p:sld>
 </file>
 
-<file path=ppt/slides/slide29.xml><?xml version="1.0" encoding="utf-8"?>
+<file path=ppt/slides/slide3.xml><?xml version="1.0" encoding="utf-8"?>
+<p:sld xmlns:a="http://schemas.openxmlformats.org/drawingml/2006/main" xmlns:r="http://schemas.openxmlformats.org/officeDocument/2006/relationships" xmlns:p="http://schemas.openxmlformats.org/presentationml/2006/main">
+  <p:cSld>
+    <p:spTree>
+      <p:nvGrpSpPr>
+        <p:cNvPr id="1" name=""/>
+        <p:cNvGrpSpPr/>
+        <p:nvPr/>
+      </p:nvGrpSpPr>
+      <p:grpSpPr>
+        <a:xfrm>
+          <a:off x="0" y="0"/>
+          <a:ext cx="0" cy="0"/>
+          <a:chOff x="0" y="0"/>
+          <a:chExt cx="0" cy="0"/>
+        </a:xfrm>
+      </p:grpSpPr>
+      <p:sp>
+        <p:nvSpPr>
+          <p:cNvPr id="4" name="Content Placeholder 3">
+            <a:extLst>
+              <a:ext uri="{FF2B5EF4-FFF2-40B4-BE49-F238E27FC236}">
+                <a16:creationId xmlns:a16="http://schemas.microsoft.com/office/drawing/2014/main" id="{AE68E5BA-C675-4302-ABDA-3EFDD6418FDE}"/>
+              </a:ext>
+            </a:extLst>
+          </p:cNvPr>
+          <p:cNvSpPr>
+            <a:spLocks noGrp="1"/>
+          </p:cNvSpPr>
+          <p:nvPr>
+            <p:ph idx="1"/>
+          </p:nvPr>
+        </p:nvSpPr>
+        <p:spPr>
+          <a:xfrm>
+            <a:off x="1371600" y="1219200"/>
+            <a:ext cx="9525000" cy="4960939"/>
+          </a:xfrm>
+        </p:spPr>
+        <p:txBody>
+          <a:bodyPr>
+            <a:normAutofit/>
+          </a:bodyPr>
+          <a:lstStyle/>
+          <a:p>
+            <a:pPr marL="0" indent="0">
+              <a:buNone/>
+            </a:pPr>
+            <a:r>
+              <a:rPr lang="en-US" sz="2000" b="1" dirty="0">
+                <a:solidFill>
+                  <a:srgbClr val="0070C0"/>
+                </a:solidFill>
+              </a:rPr>
+              <a:t>Booking office hours</a:t>
+            </a:r>
+            <a:r>
+              <a:rPr lang="en-US" sz="2000" dirty="0">
+                <a:solidFill>
+                  <a:srgbClr val="0070C0"/>
+                </a:solidFill>
+              </a:rPr>
+              <a:t>:</a:t>
+            </a:r>
+            <a:r>
+              <a:rPr lang="en-US" sz="2000" dirty="0"/>
+              <a:t> </a:t>
+            </a:r>
+            <a:r>
+              <a:rPr lang="en-US" sz="2000" u="sng" dirty="0">
+                <a:solidFill>
+                  <a:srgbClr val="0000FF"/>
+                </a:solidFill>
+                <a:latin typeface="Times New Roman" panose="02020603050405020304" pitchFamily="18" charset="0"/>
+                <a:ea typeface="Calibri" panose="020F0502020204030204" pitchFamily="34" charset="0"/>
+                <a:cs typeface="Times New Roman" panose="02020603050405020304" pitchFamily="18" charset="0"/>
+                <a:hlinkClick r:id="rId2"/>
+              </a:rPr>
+              <a:t>calendly.com/Hoagland-office-hours/had5744-2022f</a:t>
+            </a:r>
+            <a:endParaRPr lang="en-US" sz="2000" dirty="0"/>
+          </a:p>
+          <a:p>
+            <a:pPr lvl="1"/>
+            <a:r>
+              <a:rPr lang="en-US" sz="2000" dirty="0"/>
+              <a:t>In-person and Zoom options</a:t>
+            </a:r>
+          </a:p>
+          <a:p>
+            <a:pPr lvl="1"/>
+            <a:endParaRPr lang="en-US" sz="2000" dirty="0"/>
+          </a:p>
+          <a:p>
+            <a:pPr lvl="1"/>
+            <a:endParaRPr lang="en-US" sz="2000" dirty="0"/>
+          </a:p>
+        </p:txBody>
+      </p:sp>
+      <p:pic>
+        <p:nvPicPr>
+          <p:cNvPr id="7" name="Picture 6">
+            <a:extLst>
+              <a:ext uri="{FF2B5EF4-FFF2-40B4-BE49-F238E27FC236}">
+                <a16:creationId xmlns:a16="http://schemas.microsoft.com/office/drawing/2014/main" id="{FB85D007-138F-4044-AD8A-659E0889A7A9}"/>
+              </a:ext>
+            </a:extLst>
+          </p:cNvPr>
+          <p:cNvPicPr>
+            <a:picLocks noChangeAspect="1"/>
+          </p:cNvPicPr>
+          <p:nvPr/>
+        </p:nvPicPr>
+        <p:blipFill>
+          <a:blip r:embed="rId3"/>
+          <a:stretch>
+            <a:fillRect/>
+          </a:stretch>
+        </p:blipFill>
+        <p:spPr>
+          <a:xfrm>
+            <a:off x="1261872" y="1981200"/>
+            <a:ext cx="7348728" cy="4316986"/>
+          </a:xfrm>
+          <a:prstGeom prst="rect">
+            <a:avLst/>
+          </a:prstGeom>
+        </p:spPr>
+      </p:pic>
+      <p:sp>
+        <p:nvSpPr>
+          <p:cNvPr id="5" name="Title 1">
+            <a:extLst>
+              <a:ext uri="{FF2B5EF4-FFF2-40B4-BE49-F238E27FC236}">
+                <a16:creationId xmlns:a16="http://schemas.microsoft.com/office/drawing/2014/main" id="{F437DC18-F235-4588-BBC9-31299ECA7DF3}"/>
+              </a:ext>
+            </a:extLst>
+          </p:cNvPr>
+          <p:cNvSpPr txBox="1">
+            <a:spLocks/>
+          </p:cNvSpPr>
+          <p:nvPr/>
+        </p:nvSpPr>
+        <p:spPr>
+          <a:xfrm>
+            <a:off x="1261872" y="365760"/>
+            <a:ext cx="9692640" cy="777240"/>
+          </a:xfrm>
+          <a:prstGeom prst="rect">
+            <a:avLst/>
+          </a:prstGeom>
+        </p:spPr>
+        <p:txBody>
+          <a:bodyPr vert="horz" lIns="91440" tIns="45720" rIns="91440" bIns="45720" rtlCol="0" anchor="b">
+            <a:normAutofit/>
+          </a:bodyPr>
+          <a:lstStyle>
+            <a:lvl1pPr algn="l" defTabSz="914400" rtl="0" eaLnBrk="1" latinLnBrk="0" hangingPunct="1">
+              <a:lnSpc>
+                <a:spcPct val="90000"/>
+              </a:lnSpc>
+              <a:spcBef>
+                <a:spcPct val="0"/>
+              </a:spcBef>
+              <a:buNone/>
+              <a:defRPr sz="4400" kern="1200" spc="-50" baseline="0">
+                <a:solidFill>
+                  <a:schemeClr val="tx1"/>
+                </a:solidFill>
+                <a:latin typeface="+mj-lt"/>
+                <a:ea typeface="+mj-ea"/>
+                <a:cs typeface="+mj-cs"/>
+              </a:defRPr>
+            </a:lvl1pPr>
+          </a:lstStyle>
+          <a:p>
+            <a:r>
+              <a:rPr lang="en-US" dirty="0">
+                <a:latin typeface="Times New Roman" panose="02020603050405020304" pitchFamily="18" charset="0"/>
+              </a:rPr>
+              <a:t>Introduction &amp; Syllabus</a:t>
+            </a:r>
+          </a:p>
+        </p:txBody>
+      </p:sp>
+    </p:spTree>
+    <p:extLst>
+      <p:ext uri="{BB962C8B-B14F-4D97-AF65-F5344CB8AC3E}">
+        <p14:creationId xmlns:p14="http://schemas.microsoft.com/office/powerpoint/2010/main" val="162479928"/>
+      </p:ext>
+    </p:extLst>
+  </p:cSld>
+  <p:clrMapOvr>
+    <a:masterClrMapping/>
+  </p:clrMapOvr>
+</p:sld>
+</file>
+
+<file path=ppt/slides/slide30.xml><?xml version="1.0" encoding="utf-8"?>
 <p:sld xmlns:a="http://schemas.openxmlformats.org/drawingml/2006/main" xmlns:r="http://schemas.openxmlformats.org/officeDocument/2006/relationships" xmlns:p="http://schemas.openxmlformats.org/presentationml/2006/main">
   <p:cSld>
     <p:spTree>
@@ -23803,205 +24187,7 @@
 </p:sld>
 </file>
 
-<file path=ppt/slides/slide3.xml><?xml version="1.0" encoding="utf-8"?>
-<p:sld xmlns:a="http://schemas.openxmlformats.org/drawingml/2006/main" xmlns:r="http://schemas.openxmlformats.org/officeDocument/2006/relationships" xmlns:p="http://schemas.openxmlformats.org/presentationml/2006/main">
-  <p:cSld>
-    <p:spTree>
-      <p:nvGrpSpPr>
-        <p:cNvPr id="1" name=""/>
-        <p:cNvGrpSpPr/>
-        <p:nvPr/>
-      </p:nvGrpSpPr>
-      <p:grpSpPr>
-        <a:xfrm>
-          <a:off x="0" y="0"/>
-          <a:ext cx="0" cy="0"/>
-          <a:chOff x="0" y="0"/>
-          <a:chExt cx="0" cy="0"/>
-        </a:xfrm>
-      </p:grpSpPr>
-      <p:sp>
-        <p:nvSpPr>
-          <p:cNvPr id="4" name="Content Placeholder 3">
-            <a:extLst>
-              <a:ext uri="{FF2B5EF4-FFF2-40B4-BE49-F238E27FC236}">
-                <a16:creationId xmlns:a16="http://schemas.microsoft.com/office/drawing/2014/main" id="{AE68E5BA-C675-4302-ABDA-3EFDD6418FDE}"/>
-              </a:ext>
-            </a:extLst>
-          </p:cNvPr>
-          <p:cNvSpPr>
-            <a:spLocks noGrp="1"/>
-          </p:cNvSpPr>
-          <p:nvPr>
-            <p:ph idx="1"/>
-          </p:nvPr>
-        </p:nvSpPr>
-        <p:spPr>
-          <a:xfrm>
-            <a:off x="1371600" y="1219200"/>
-            <a:ext cx="9525000" cy="4960939"/>
-          </a:xfrm>
-        </p:spPr>
-        <p:txBody>
-          <a:bodyPr>
-            <a:normAutofit/>
-          </a:bodyPr>
-          <a:lstStyle/>
-          <a:p>
-            <a:pPr marL="0" indent="0">
-              <a:buNone/>
-            </a:pPr>
-            <a:r>
-              <a:rPr lang="en-US" sz="2000" b="1" dirty="0">
-                <a:solidFill>
-                  <a:srgbClr val="0070C0"/>
-                </a:solidFill>
-              </a:rPr>
-              <a:t>Booking office hours</a:t>
-            </a:r>
-            <a:r>
-              <a:rPr lang="en-US" sz="2000" dirty="0">
-                <a:solidFill>
-                  <a:srgbClr val="0070C0"/>
-                </a:solidFill>
-              </a:rPr>
-              <a:t>:</a:t>
-            </a:r>
-            <a:r>
-              <a:rPr lang="en-US" sz="2000" dirty="0"/>
-              <a:t> </a:t>
-            </a:r>
-            <a:r>
-              <a:rPr lang="en-US" sz="2000" u="sng" dirty="0">
-                <a:solidFill>
-                  <a:srgbClr val="0000FF"/>
-                </a:solidFill>
-                <a:latin typeface="Times New Roman" panose="02020603050405020304" pitchFamily="18" charset="0"/>
-                <a:ea typeface="Calibri" panose="020F0502020204030204" pitchFamily="34" charset="0"/>
-                <a:cs typeface="Times New Roman" panose="02020603050405020304" pitchFamily="18" charset="0"/>
-                <a:hlinkClick r:id="rId2"/>
-              </a:rPr>
-              <a:t>calendly.com/Hoagland-office-hours/had5744-2022f</a:t>
-            </a:r>
-            <a:endParaRPr lang="en-US" sz="2000" dirty="0"/>
-          </a:p>
-          <a:p>
-            <a:pPr lvl="1"/>
-            <a:r>
-              <a:rPr lang="en-US" sz="2000" dirty="0"/>
-              <a:t>In-person and Zoom options</a:t>
-            </a:r>
-          </a:p>
-          <a:p>
-            <a:pPr lvl="1"/>
-            <a:endParaRPr lang="en-US" sz="2000" dirty="0"/>
-          </a:p>
-          <a:p>
-            <a:pPr lvl="1"/>
-            <a:endParaRPr lang="en-US" sz="2000" dirty="0"/>
-          </a:p>
-        </p:txBody>
-      </p:sp>
-      <p:pic>
-        <p:nvPicPr>
-          <p:cNvPr id="7" name="Picture 6">
-            <a:extLst>
-              <a:ext uri="{FF2B5EF4-FFF2-40B4-BE49-F238E27FC236}">
-                <a16:creationId xmlns:a16="http://schemas.microsoft.com/office/drawing/2014/main" id="{FB85D007-138F-4044-AD8A-659E0889A7A9}"/>
-              </a:ext>
-            </a:extLst>
-          </p:cNvPr>
-          <p:cNvPicPr>
-            <a:picLocks noChangeAspect="1"/>
-          </p:cNvPicPr>
-          <p:nvPr/>
-        </p:nvPicPr>
-        <p:blipFill>
-          <a:blip r:embed="rId3"/>
-          <a:stretch>
-            <a:fillRect/>
-          </a:stretch>
-        </p:blipFill>
-        <p:spPr>
-          <a:xfrm>
-            <a:off x="1261872" y="1981200"/>
-            <a:ext cx="7348728" cy="4316986"/>
-          </a:xfrm>
-          <a:prstGeom prst="rect">
-            <a:avLst/>
-          </a:prstGeom>
-        </p:spPr>
-      </p:pic>
-      <p:sp>
-        <p:nvSpPr>
-          <p:cNvPr id="5" name="Title 1">
-            <a:extLst>
-              <a:ext uri="{FF2B5EF4-FFF2-40B4-BE49-F238E27FC236}">
-                <a16:creationId xmlns:a16="http://schemas.microsoft.com/office/drawing/2014/main" id="{F437DC18-F235-4588-BBC9-31299ECA7DF3}"/>
-              </a:ext>
-            </a:extLst>
-          </p:cNvPr>
-          <p:cNvSpPr txBox="1">
-            <a:spLocks/>
-          </p:cNvSpPr>
-          <p:nvPr/>
-        </p:nvSpPr>
-        <p:spPr>
-          <a:xfrm>
-            <a:off x="1261872" y="365760"/>
-            <a:ext cx="9692640" cy="777240"/>
-          </a:xfrm>
-          <a:prstGeom prst="rect">
-            <a:avLst/>
-          </a:prstGeom>
-        </p:spPr>
-        <p:txBody>
-          <a:bodyPr vert="horz" lIns="91440" tIns="45720" rIns="91440" bIns="45720" rtlCol="0" anchor="b">
-            <a:normAutofit/>
-          </a:bodyPr>
-          <a:lstStyle>
-            <a:lvl1pPr algn="l" defTabSz="914400" rtl="0" eaLnBrk="1" latinLnBrk="0" hangingPunct="1">
-              <a:lnSpc>
-                <a:spcPct val="90000"/>
-              </a:lnSpc>
-              <a:spcBef>
-                <a:spcPct val="0"/>
-              </a:spcBef>
-              <a:buNone/>
-              <a:defRPr sz="4400" kern="1200" spc="-50" baseline="0">
-                <a:solidFill>
-                  <a:schemeClr val="tx1"/>
-                </a:solidFill>
-                <a:latin typeface="+mj-lt"/>
-                <a:ea typeface="+mj-ea"/>
-                <a:cs typeface="+mj-cs"/>
-              </a:defRPr>
-            </a:lvl1pPr>
-          </a:lstStyle>
-          <a:p>
-            <a:r>
-              <a:rPr lang="en-US" dirty="0">
-                <a:latin typeface="Times New Roman" panose="02020603050405020304" pitchFamily="18" charset="0"/>
-              </a:rPr>
-              <a:t>Introduction &amp; Syllabus</a:t>
-            </a:r>
-          </a:p>
-        </p:txBody>
-      </p:sp>
-    </p:spTree>
-    <p:extLst>
-      <p:ext uri="{BB962C8B-B14F-4D97-AF65-F5344CB8AC3E}">
-        <p14:creationId xmlns:p14="http://schemas.microsoft.com/office/powerpoint/2010/main" val="162479928"/>
-      </p:ext>
-    </p:extLst>
-  </p:cSld>
-  <p:clrMapOvr>
-    <a:masterClrMapping/>
-  </p:clrMapOvr>
-</p:sld>
-</file>
-
-<file path=ppt/slides/slide30.xml><?xml version="1.0" encoding="utf-8"?>
+<file path=ppt/slides/slide31.xml><?xml version="1.0" encoding="utf-8"?>
 <p:sld xmlns:a="http://schemas.openxmlformats.org/drawingml/2006/main" xmlns:r="http://schemas.openxmlformats.org/officeDocument/2006/relationships" xmlns:p="http://schemas.openxmlformats.org/presentationml/2006/main">
   <p:cSld>
     <p:spTree>
@@ -25486,7 +25672,7 @@
 </p:sld>
 </file>
 
-<file path=ppt/slides/slide31.xml><?xml version="1.0" encoding="utf-8"?>
+<file path=ppt/slides/slide32.xml><?xml version="1.0" encoding="utf-8"?>
 <p:sld xmlns:a="http://schemas.openxmlformats.org/drawingml/2006/main" xmlns:r="http://schemas.openxmlformats.org/officeDocument/2006/relationships" xmlns:p="http://schemas.openxmlformats.org/presentationml/2006/main">
   <p:cSld>
     <p:spTree>
@@ -27183,140 +27369,6 @@
 </p:sld>
 </file>
 
-<file path=ppt/slides/slide32.xml><?xml version="1.0" encoding="utf-8"?>
-<p:sld xmlns:a="http://schemas.openxmlformats.org/drawingml/2006/main" xmlns:r="http://schemas.openxmlformats.org/officeDocument/2006/relationships" xmlns:p="http://schemas.openxmlformats.org/presentationml/2006/main">
-  <p:cSld>
-    <p:spTree>
-      <p:nvGrpSpPr>
-        <p:cNvPr id="1" name=""/>
-        <p:cNvGrpSpPr/>
-        <p:nvPr/>
-      </p:nvGrpSpPr>
-      <p:grpSpPr>
-        <a:xfrm>
-          <a:off x="0" y="0"/>
-          <a:ext cx="0" cy="0"/>
-          <a:chOff x="0" y="0"/>
-          <a:chExt cx="0" cy="0"/>
-        </a:xfrm>
-      </p:grpSpPr>
-      <p:sp>
-        <p:nvSpPr>
-          <p:cNvPr id="2" name="Title 1"/>
-          <p:cNvSpPr>
-            <a:spLocks noGrp="1"/>
-          </p:cNvSpPr>
-          <p:nvPr>
-            <p:ph type="title"/>
-          </p:nvPr>
-        </p:nvSpPr>
-        <p:spPr>
-          <a:xfrm>
-            <a:off x="1066801" y="234677"/>
-            <a:ext cx="8077200" cy="701040"/>
-          </a:xfrm>
-        </p:spPr>
-        <p:txBody>
-          <a:bodyPr>
-            <a:normAutofit/>
-          </a:bodyPr>
-          <a:lstStyle/>
-          <a:p>
-            <a:r>
-              <a:rPr lang="en-US" dirty="0"/>
-              <a:t>Estimating an ATE</a:t>
-            </a:r>
-          </a:p>
-        </p:txBody>
-      </p:sp>
-      <p:sp>
-        <p:nvSpPr>
-          <p:cNvPr id="3" name="Content Placeholder 2"/>
-          <p:cNvSpPr>
-            <a:spLocks noGrp="1"/>
-          </p:cNvSpPr>
-          <p:nvPr>
-            <p:ph idx="1"/>
-          </p:nvPr>
-        </p:nvSpPr>
-        <p:spPr>
-          <a:xfrm>
-            <a:off x="1066801" y="990600"/>
-            <a:ext cx="8381999" cy="5638800"/>
-          </a:xfrm>
-        </p:spPr>
-        <p:txBody>
-          <a:bodyPr>
-            <a:noAutofit/>
-          </a:bodyPr>
-          <a:lstStyle/>
-          <a:p>
-            <a:pPr marL="0" indent="0">
-              <a:buNone/>
-            </a:pPr>
-            <a:r>
-              <a:rPr lang="en-US" sz="2000" dirty="0"/>
-              <a:t>What does the estimated ATE mean?</a:t>
-            </a:r>
-          </a:p>
-          <a:p>
-            <a:r>
-              <a:rPr lang="en-US" sz="2000" dirty="0"/>
-              <a:t>Does this mean surgery has a negative effect?  </a:t>
-            </a:r>
-          </a:p>
-          <a:p>
-            <a:pPr marL="0" indent="0">
-              <a:buNone/>
-            </a:pPr>
-            <a:endParaRPr lang="en-US" sz="2000" dirty="0">
-              <a:solidFill>
-                <a:srgbClr val="0070C0"/>
-              </a:solidFill>
-            </a:endParaRPr>
-          </a:p>
-          <a:p>
-            <a:endParaRPr lang="en-US" sz="2000" dirty="0"/>
-          </a:p>
-          <a:p>
-            <a:endParaRPr lang="en-US" sz="2000" dirty="0"/>
-          </a:p>
-          <a:p>
-            <a:endParaRPr lang="en-US" sz="2000" dirty="0"/>
-          </a:p>
-          <a:p>
-            <a:endParaRPr lang="en-US" sz="2000" dirty="0"/>
-          </a:p>
-          <a:p>
-            <a:endParaRPr lang="en-US" sz="2000" dirty="0"/>
-          </a:p>
-          <a:p>
-            <a:endParaRPr lang="en-US" sz="2000" dirty="0"/>
-          </a:p>
-          <a:p>
-            <a:endParaRPr lang="en-US" sz="2000" dirty="0"/>
-          </a:p>
-          <a:p>
-            <a:endParaRPr lang="en-US" sz="2000" dirty="0"/>
-          </a:p>
-          <a:p>
-            <a:endParaRPr lang="en-US" sz="2000" dirty="0"/>
-          </a:p>
-        </p:txBody>
-      </p:sp>
-    </p:spTree>
-    <p:extLst>
-      <p:ext uri="{BB962C8B-B14F-4D97-AF65-F5344CB8AC3E}">
-        <p14:creationId xmlns:p14="http://schemas.microsoft.com/office/powerpoint/2010/main" val="168807109"/>
-      </p:ext>
-    </p:extLst>
-  </p:cSld>
-  <p:clrMapOvr>
-    <a:masterClrMapping/>
-  </p:clrMapOvr>
-</p:sld>
-</file>
-
 <file path=ppt/slides/slide33.xml><?xml version="1.0" encoding="utf-8"?>
 <p:sld xmlns:a="http://schemas.openxmlformats.org/drawingml/2006/main" xmlns:r="http://schemas.openxmlformats.org/officeDocument/2006/relationships" xmlns:p="http://schemas.openxmlformats.org/presentationml/2006/main">
   <p:cSld>
@@ -27396,6 +27448,140 @@
           <a:p>
             <a:r>
               <a:rPr lang="en-US" sz="2000" dirty="0"/>
+              <a:t>Does this mean surgery has a negative effect?  </a:t>
+            </a:r>
+          </a:p>
+          <a:p>
+            <a:pPr marL="0" indent="0">
+              <a:buNone/>
+            </a:pPr>
+            <a:endParaRPr lang="en-US" sz="2000" dirty="0">
+              <a:solidFill>
+                <a:srgbClr val="0070C0"/>
+              </a:solidFill>
+            </a:endParaRPr>
+          </a:p>
+          <a:p>
+            <a:endParaRPr lang="en-US" sz="2000" dirty="0"/>
+          </a:p>
+          <a:p>
+            <a:endParaRPr lang="en-US" sz="2000" dirty="0"/>
+          </a:p>
+          <a:p>
+            <a:endParaRPr lang="en-US" sz="2000" dirty="0"/>
+          </a:p>
+          <a:p>
+            <a:endParaRPr lang="en-US" sz="2000" dirty="0"/>
+          </a:p>
+          <a:p>
+            <a:endParaRPr lang="en-US" sz="2000" dirty="0"/>
+          </a:p>
+          <a:p>
+            <a:endParaRPr lang="en-US" sz="2000" dirty="0"/>
+          </a:p>
+          <a:p>
+            <a:endParaRPr lang="en-US" sz="2000" dirty="0"/>
+          </a:p>
+          <a:p>
+            <a:endParaRPr lang="en-US" sz="2000" dirty="0"/>
+          </a:p>
+          <a:p>
+            <a:endParaRPr lang="en-US" sz="2000" dirty="0"/>
+          </a:p>
+        </p:txBody>
+      </p:sp>
+    </p:spTree>
+    <p:extLst>
+      <p:ext uri="{BB962C8B-B14F-4D97-AF65-F5344CB8AC3E}">
+        <p14:creationId xmlns:p14="http://schemas.microsoft.com/office/powerpoint/2010/main" val="168807109"/>
+      </p:ext>
+    </p:extLst>
+  </p:cSld>
+  <p:clrMapOvr>
+    <a:masterClrMapping/>
+  </p:clrMapOvr>
+</p:sld>
+</file>
+
+<file path=ppt/slides/slide34.xml><?xml version="1.0" encoding="utf-8"?>
+<p:sld xmlns:a="http://schemas.openxmlformats.org/drawingml/2006/main" xmlns:r="http://schemas.openxmlformats.org/officeDocument/2006/relationships" xmlns:p="http://schemas.openxmlformats.org/presentationml/2006/main">
+  <p:cSld>
+    <p:spTree>
+      <p:nvGrpSpPr>
+        <p:cNvPr id="1" name=""/>
+        <p:cNvGrpSpPr/>
+        <p:nvPr/>
+      </p:nvGrpSpPr>
+      <p:grpSpPr>
+        <a:xfrm>
+          <a:off x="0" y="0"/>
+          <a:ext cx="0" cy="0"/>
+          <a:chOff x="0" y="0"/>
+          <a:chExt cx="0" cy="0"/>
+        </a:xfrm>
+      </p:grpSpPr>
+      <p:sp>
+        <p:nvSpPr>
+          <p:cNvPr id="2" name="Title 1"/>
+          <p:cNvSpPr>
+            <a:spLocks noGrp="1"/>
+          </p:cNvSpPr>
+          <p:nvPr>
+            <p:ph type="title"/>
+          </p:nvPr>
+        </p:nvSpPr>
+        <p:spPr>
+          <a:xfrm>
+            <a:off x="1066801" y="234677"/>
+            <a:ext cx="8077200" cy="701040"/>
+          </a:xfrm>
+        </p:spPr>
+        <p:txBody>
+          <a:bodyPr>
+            <a:normAutofit/>
+          </a:bodyPr>
+          <a:lstStyle/>
+          <a:p>
+            <a:r>
+              <a:rPr lang="en-US" dirty="0"/>
+              <a:t>Estimating an ATE</a:t>
+            </a:r>
+          </a:p>
+        </p:txBody>
+      </p:sp>
+      <p:sp>
+        <p:nvSpPr>
+          <p:cNvPr id="3" name="Content Placeholder 2"/>
+          <p:cNvSpPr>
+            <a:spLocks noGrp="1"/>
+          </p:cNvSpPr>
+          <p:nvPr>
+            <p:ph idx="1"/>
+          </p:nvPr>
+        </p:nvSpPr>
+        <p:spPr>
+          <a:xfrm>
+            <a:off x="1066801" y="990600"/>
+            <a:ext cx="8381999" cy="5638800"/>
+          </a:xfrm>
+        </p:spPr>
+        <p:txBody>
+          <a:bodyPr>
+            <a:noAutofit/>
+          </a:bodyPr>
+          <a:lstStyle/>
+          <a:p>
+            <a:pPr marL="0" indent="0">
+              <a:buNone/>
+            </a:pPr>
+            <a:r>
+              <a:rPr lang="en-US" sz="2000" dirty="0"/>
+              <a:t>What does the estimated ATE mean?</a:t>
+            </a:r>
+          </a:p>
+          <a:p>
+            <a:r>
+              <a:rPr lang="en-US" sz="2000" dirty="0"/>
               <a:t>Does this mean surgery has a negative effect?</a:t>
             </a:r>
           </a:p>
@@ -27482,7 +27668,7 @@
 </p:sld>
 </file>
 
-<file path=ppt/slides/slide34.xml><?xml version="1.0" encoding="utf-8"?>
+<file path=ppt/slides/slide35.xml><?xml version="1.0" encoding="utf-8"?>
 <p:sld xmlns:a="http://schemas.openxmlformats.org/drawingml/2006/main" xmlns:r="http://schemas.openxmlformats.org/officeDocument/2006/relationships" xmlns:p="http://schemas.openxmlformats.org/presentationml/2006/main">
   <p:cSld>
     <p:spTree>
@@ -27862,7 +28048,7 @@
 </p:sld>
 </file>
 
-<file path=ppt/slides/slide35.xml><?xml version="1.0" encoding="utf-8"?>
+<file path=ppt/slides/slide36.xml><?xml version="1.0" encoding="utf-8"?>
 <p:sld xmlns:a="http://schemas.openxmlformats.org/drawingml/2006/main" xmlns:r="http://schemas.openxmlformats.org/officeDocument/2006/relationships" xmlns:p="http://schemas.openxmlformats.org/presentationml/2006/main">
   <p:cSld>
     <p:spTree>
@@ -28127,7 +28313,7 @@
 </p:sld>
 </file>
 
-<file path=ppt/slides/slide36.xml><?xml version="1.0" encoding="utf-8"?>
+<file path=ppt/slides/slide37.xml><?xml version="1.0" encoding="utf-8"?>
 <p:sld xmlns:a="http://schemas.openxmlformats.org/drawingml/2006/main" xmlns:r="http://schemas.openxmlformats.org/officeDocument/2006/relationships" xmlns:p="http://schemas.openxmlformats.org/presentationml/2006/main">
   <p:cSld>
     <p:spTree>
@@ -28734,7 +28920,7 @@
 </p:sld>
 </file>
 
-<file path=ppt/slides/slide37.xml><?xml version="1.0" encoding="utf-8"?>
+<file path=ppt/slides/slide38.xml><?xml version="1.0" encoding="utf-8"?>
 <p:sld xmlns:a="http://schemas.openxmlformats.org/drawingml/2006/main" xmlns:r="http://schemas.openxmlformats.org/officeDocument/2006/relationships" xmlns:p="http://schemas.openxmlformats.org/presentationml/2006/main">
   <p:cSld>
     <p:spTree>
@@ -28896,7 +29082,7 @@
 </p:sld>
 </file>
 
-<file path=ppt/slides/slide38.xml><?xml version="1.0" encoding="utf-8"?>
+<file path=ppt/slides/slide39.xml><?xml version="1.0" encoding="utf-8"?>
 <p:sld xmlns:a="http://schemas.openxmlformats.org/drawingml/2006/main" xmlns:r="http://schemas.openxmlformats.org/officeDocument/2006/relationships" xmlns:p="http://schemas.openxmlformats.org/presentationml/2006/main">
   <p:cSld>
     <p:spTree>
@@ -31920,6 +32106,187 @@
 </file>
 
 <file path=ppt/slides/slide8.xml><?xml version="1.0" encoding="utf-8"?>
+<p:sld xmlns:a="http://schemas.openxmlformats.org/drawingml/2006/main" xmlns:r="http://schemas.openxmlformats.org/officeDocument/2006/relationships" xmlns:p="http://schemas.openxmlformats.org/presentationml/2006/main">
+  <p:cSld>
+    <p:spTree>
+      <p:nvGrpSpPr>
+        <p:cNvPr id="1" name=""/>
+        <p:cNvGrpSpPr/>
+        <p:nvPr/>
+      </p:nvGrpSpPr>
+      <p:grpSpPr>
+        <a:xfrm>
+          <a:off x="0" y="0"/>
+          <a:ext cx="0" cy="0"/>
+          <a:chOff x="0" y="0"/>
+          <a:chExt cx="0" cy="0"/>
+        </a:xfrm>
+      </p:grpSpPr>
+      <p:sp>
+        <p:nvSpPr>
+          <p:cNvPr id="4" name="Content Placeholder 3">
+            <a:extLst>
+              <a:ext uri="{FF2B5EF4-FFF2-40B4-BE49-F238E27FC236}">
+                <a16:creationId xmlns:a16="http://schemas.microsoft.com/office/drawing/2014/main" id="{AE68E5BA-C675-4302-ABDA-3EFDD6418FDE}"/>
+              </a:ext>
+            </a:extLst>
+          </p:cNvPr>
+          <p:cNvSpPr>
+            <a:spLocks noGrp="1"/>
+          </p:cNvSpPr>
+          <p:nvPr>
+            <p:ph idx="1"/>
+          </p:nvPr>
+        </p:nvSpPr>
+        <p:spPr>
+          <a:xfrm>
+            <a:off x="2470404" y="1608139"/>
+            <a:ext cx="7359396" cy="4572000"/>
+          </a:xfrm>
+        </p:spPr>
+        <p:txBody>
+          <a:bodyPr/>
+          <a:lstStyle/>
+          <a:p>
+            <a:pPr lvl="1"/>
+            <a:endParaRPr lang="en-US" dirty="0"/>
+          </a:p>
+          <a:p>
+            <a:pPr lvl="1"/>
+            <a:endParaRPr lang="en-US" dirty="0"/>
+          </a:p>
+        </p:txBody>
+      </p:sp>
+      <p:sp>
+        <p:nvSpPr>
+          <p:cNvPr id="6" name="Title 1">
+            <a:extLst>
+              <a:ext uri="{FF2B5EF4-FFF2-40B4-BE49-F238E27FC236}">
+                <a16:creationId xmlns:a16="http://schemas.microsoft.com/office/drawing/2014/main" id="{2447C70A-E8CD-4D7B-8C00-FF6EC3DCB236}"/>
+              </a:ext>
+            </a:extLst>
+          </p:cNvPr>
+          <p:cNvSpPr txBox="1">
+            <a:spLocks/>
+          </p:cNvSpPr>
+          <p:nvPr/>
+        </p:nvSpPr>
+        <p:spPr>
+          <a:xfrm>
+            <a:off x="1261872" y="365760"/>
+            <a:ext cx="9692640" cy="777240"/>
+          </a:xfrm>
+          <a:prstGeom prst="rect">
+            <a:avLst/>
+          </a:prstGeom>
+        </p:spPr>
+        <p:txBody>
+          <a:bodyPr vert="horz" lIns="91440" tIns="45720" rIns="91440" bIns="45720" rtlCol="0" anchor="b">
+            <a:normAutofit/>
+          </a:bodyPr>
+          <a:lstStyle>
+            <a:lvl1pPr algn="l" defTabSz="914400" rtl="0" eaLnBrk="1" latinLnBrk="0" hangingPunct="1">
+              <a:lnSpc>
+                <a:spcPct val="90000"/>
+              </a:lnSpc>
+              <a:spcBef>
+                <a:spcPct val="0"/>
+              </a:spcBef>
+              <a:buNone/>
+              <a:defRPr sz="4400" kern="1200" spc="-50" baseline="0">
+                <a:solidFill>
+                  <a:schemeClr val="tx1"/>
+                </a:solidFill>
+                <a:latin typeface="+mj-lt"/>
+                <a:ea typeface="+mj-ea"/>
+                <a:cs typeface="+mj-cs"/>
+              </a:defRPr>
+            </a:lvl1pPr>
+          </a:lstStyle>
+          <a:p>
+            <a:r>
+              <a:rPr lang="en-US" dirty="0">
+                <a:latin typeface="Times New Roman" panose="02020603050405020304" pitchFamily="18" charset="0"/>
+              </a:rPr>
+              <a:t>Introduction &amp; Syllabus</a:t>
+            </a:r>
+          </a:p>
+        </p:txBody>
+      </p:sp>
+      <p:sp>
+        <p:nvSpPr>
+          <p:cNvPr id="8" name="Title 7">
+            <a:extLst>
+              <a:ext uri="{FF2B5EF4-FFF2-40B4-BE49-F238E27FC236}">
+                <a16:creationId xmlns:a16="http://schemas.microsoft.com/office/drawing/2014/main" id="{D13B5070-8B01-4C63-9F2E-79CAC4D00929}"/>
+              </a:ext>
+            </a:extLst>
+          </p:cNvPr>
+          <p:cNvSpPr>
+            <a:spLocks noGrp="1"/>
+          </p:cNvSpPr>
+          <p:nvPr>
+            <p:ph type="title"/>
+          </p:nvPr>
+        </p:nvSpPr>
+        <p:spPr/>
+        <p:txBody>
+          <a:bodyPr>
+            <a:normAutofit/>
+          </a:bodyPr>
+          <a:lstStyle/>
+          <a:p>
+            <a:r>
+              <a:rPr lang="en-US" sz="3600" dirty="0"/>
+              <a:t>One Pet Peeve: </a:t>
+            </a:r>
+          </a:p>
+        </p:txBody>
+      </p:sp>
+      <p:pic>
+        <p:nvPicPr>
+          <p:cNvPr id="3" name="Picture 2">
+            <a:extLst>
+              <a:ext uri="{FF2B5EF4-FFF2-40B4-BE49-F238E27FC236}">
+                <a16:creationId xmlns:a16="http://schemas.microsoft.com/office/drawing/2014/main" id="{833370FD-9F6E-44BA-A617-4B97C3866C26}"/>
+              </a:ext>
+            </a:extLst>
+          </p:cNvPr>
+          <p:cNvPicPr>
+            <a:picLocks noChangeAspect="1"/>
+          </p:cNvPicPr>
+          <p:nvPr/>
+        </p:nvPicPr>
+        <p:blipFill>
+          <a:blip r:embed="rId3"/>
+          <a:stretch>
+            <a:fillRect/>
+          </a:stretch>
+        </p:blipFill>
+        <p:spPr>
+          <a:xfrm>
+            <a:off x="1371600" y="1817614"/>
+            <a:ext cx="9000000" cy="3222771"/>
+          </a:xfrm>
+          <a:prstGeom prst="rect">
+            <a:avLst/>
+          </a:prstGeom>
+        </p:spPr>
+      </p:pic>
+    </p:spTree>
+    <p:extLst>
+      <p:ext uri="{BB962C8B-B14F-4D97-AF65-F5344CB8AC3E}">
+        <p14:creationId xmlns:p14="http://schemas.microsoft.com/office/powerpoint/2010/main" val="190750474"/>
+      </p:ext>
+    </p:extLst>
+  </p:cSld>
+  <p:clrMapOvr>
+    <a:masterClrMapping/>
+  </p:clrMapOvr>
+</p:sld>
+</file>
+
+<file path=ppt/slides/slide9.xml><?xml version="1.0" encoding="utf-8"?>
 <p:sld xmlns:a="http://schemas.openxmlformats.org/drawingml/2006/main" xmlns:r="http://schemas.openxmlformats.org/officeDocument/2006/relationships" xmlns:p="http://schemas.openxmlformats.org/presentationml/2006/main">
   <p:cSld>
     <p:spTree>
@@ -32223,104 +32590,6 @@
         </mc:Fallback>
       </mc:AlternateContent>
     </p:spTree>
-  </p:cSld>
-  <p:clrMapOvr>
-    <a:masterClrMapping/>
-  </p:clrMapOvr>
-</p:sld>
-</file>
-
-<file path=ppt/slides/slide9.xml><?xml version="1.0" encoding="utf-8"?>
-<p:sld xmlns:a="http://schemas.openxmlformats.org/drawingml/2006/main" xmlns:r="http://schemas.openxmlformats.org/officeDocument/2006/relationships" xmlns:p="http://schemas.openxmlformats.org/presentationml/2006/main">
-  <p:cSld>
-    <p:spTree>
-      <p:nvGrpSpPr>
-        <p:cNvPr id="1" name=""/>
-        <p:cNvGrpSpPr/>
-        <p:nvPr/>
-      </p:nvGrpSpPr>
-      <p:grpSpPr>
-        <a:xfrm>
-          <a:off x="0" y="0"/>
-          <a:ext cx="0" cy="0"/>
-          <a:chOff x="0" y="0"/>
-          <a:chExt cx="0" cy="0"/>
-        </a:xfrm>
-      </p:grpSpPr>
-      <p:sp>
-        <p:nvSpPr>
-          <p:cNvPr id="2" name="Title 1"/>
-          <p:cNvSpPr>
-            <a:spLocks noGrp="1"/>
-          </p:cNvSpPr>
-          <p:nvPr>
-            <p:ph type="title"/>
-          </p:nvPr>
-        </p:nvSpPr>
-        <p:spPr>
-          <a:xfrm>
-            <a:off x="762000" y="337392"/>
-            <a:ext cx="7269480" cy="624840"/>
-          </a:xfrm>
-        </p:spPr>
-        <p:txBody>
-          <a:bodyPr>
-            <a:noAutofit/>
-          </a:bodyPr>
-          <a:lstStyle/>
-          <a:p>
-            <a:pPr algn="ctr"/>
-            <a:r>
-              <a:rPr lang="en-US" dirty="0"/>
-              <a:t>All that glitters is an RCT?</a:t>
-            </a:r>
-          </a:p>
-        </p:txBody>
-      </p:sp>
-      <p:sp>
-        <p:nvSpPr>
-          <p:cNvPr id="3" name="Content Placeholder 2"/>
-          <p:cNvSpPr>
-            <a:spLocks noGrp="1"/>
-          </p:cNvSpPr>
-          <p:nvPr>
-            <p:ph idx="1"/>
-          </p:nvPr>
-        </p:nvSpPr>
-        <p:spPr>
-          <a:xfrm>
-            <a:off x="990600" y="1143001"/>
-            <a:ext cx="9982200" cy="5065188"/>
-          </a:xfrm>
-        </p:spPr>
-        <p:txBody>
-          <a:bodyPr/>
-          <a:lstStyle/>
-          <a:p>
-            <a:r>
-              <a:rPr lang="en-US" sz="2000" dirty="0"/>
-              <a:t>Can we only believe </a:t>
-            </a:r>
-            <a:r>
-              <a:rPr lang="en-US" sz="2000" b="1" dirty="0"/>
-              <a:t>randomized control trials?</a:t>
-            </a:r>
-          </a:p>
-          <a:p>
-            <a:r>
-              <a:rPr lang="en-US" sz="2000" dirty="0"/>
-              <a:t>RCTs are useful in some settings, but what are some problems with them? </a:t>
-            </a:r>
-            <a:endParaRPr lang="en-US" dirty="0"/>
-          </a:p>
-        </p:txBody>
-      </p:sp>
-    </p:spTree>
-    <p:extLst>
-      <p:ext uri="{BB962C8B-B14F-4D97-AF65-F5344CB8AC3E}">
-        <p14:creationId xmlns:p14="http://schemas.microsoft.com/office/powerpoint/2010/main" val="4190568736"/>
-      </p:ext>
-    </p:extLst>
   </p:cSld>
   <p:clrMapOvr>
     <a:masterClrMapping/>

</xml_diff>